<commit_message>
Logistic Regression Analysis - Data Files
</commit_message>
<xml_diff>
--- a/Predicting Influencers in a Social Network.pptx
+++ b/Predicting Influencers in a Social Network.pptx
@@ -253,7 +253,7 @@
           <a:p>
             <a:fld id="{A1E43CF0-0252-41F7-9C8E-CC9681AEFB28}" type="datetimeFigureOut">
               <a:rPr lang="en-US" smtClean="0"/>
-              <a:t>25-Nov-16</a:t>
+              <a:t>11/26/2016</a:t>
             </a:fld>
             <a:endParaRPr lang="en-US"/>
           </a:p>
@@ -421,7 +421,7 @@
           <a:p>
             <a:fld id="{A1E43CF0-0252-41F7-9C8E-CC9681AEFB28}" type="datetimeFigureOut">
               <a:rPr lang="en-US" smtClean="0"/>
-              <a:t>25-Nov-16</a:t>
+              <a:t>11/26/2016</a:t>
             </a:fld>
             <a:endParaRPr lang="en-US"/>
           </a:p>
@@ -599,7 +599,7 @@
           <a:p>
             <a:fld id="{A1E43CF0-0252-41F7-9C8E-CC9681AEFB28}" type="datetimeFigureOut">
               <a:rPr lang="en-US" smtClean="0"/>
-              <a:t>25-Nov-16</a:t>
+              <a:t>11/26/2016</a:t>
             </a:fld>
             <a:endParaRPr lang="en-US"/>
           </a:p>
@@ -767,7 +767,7 @@
           <a:p>
             <a:fld id="{A1E43CF0-0252-41F7-9C8E-CC9681AEFB28}" type="datetimeFigureOut">
               <a:rPr lang="en-US" smtClean="0"/>
-              <a:t>25-Nov-16</a:t>
+              <a:t>11/26/2016</a:t>
             </a:fld>
             <a:endParaRPr lang="en-US"/>
           </a:p>
@@ -1012,7 +1012,7 @@
           <a:p>
             <a:fld id="{A1E43CF0-0252-41F7-9C8E-CC9681AEFB28}" type="datetimeFigureOut">
               <a:rPr lang="en-US" smtClean="0"/>
-              <a:t>25-Nov-16</a:t>
+              <a:t>11/26/2016</a:t>
             </a:fld>
             <a:endParaRPr lang="en-US"/>
           </a:p>
@@ -1241,7 +1241,7 @@
           <a:p>
             <a:fld id="{A1E43CF0-0252-41F7-9C8E-CC9681AEFB28}" type="datetimeFigureOut">
               <a:rPr lang="en-US" smtClean="0"/>
-              <a:t>25-Nov-16</a:t>
+              <a:t>11/26/2016</a:t>
             </a:fld>
             <a:endParaRPr lang="en-US"/>
           </a:p>
@@ -1605,7 +1605,7 @@
           <a:p>
             <a:fld id="{A1E43CF0-0252-41F7-9C8E-CC9681AEFB28}" type="datetimeFigureOut">
               <a:rPr lang="en-US" smtClean="0"/>
-              <a:t>25-Nov-16</a:t>
+              <a:t>11/26/2016</a:t>
             </a:fld>
             <a:endParaRPr lang="en-US"/>
           </a:p>
@@ -1722,7 +1722,7 @@
           <a:p>
             <a:fld id="{A1E43CF0-0252-41F7-9C8E-CC9681AEFB28}" type="datetimeFigureOut">
               <a:rPr lang="en-US" smtClean="0"/>
-              <a:t>25-Nov-16</a:t>
+              <a:t>11/26/2016</a:t>
             </a:fld>
             <a:endParaRPr lang="en-US"/>
           </a:p>
@@ -1817,7 +1817,7 @@
           <a:p>
             <a:fld id="{A1E43CF0-0252-41F7-9C8E-CC9681AEFB28}" type="datetimeFigureOut">
               <a:rPr lang="en-US" smtClean="0"/>
-              <a:t>25-Nov-16</a:t>
+              <a:t>11/26/2016</a:t>
             </a:fld>
             <a:endParaRPr lang="en-US"/>
           </a:p>
@@ -2092,7 +2092,7 @@
           <a:p>
             <a:fld id="{A1E43CF0-0252-41F7-9C8E-CC9681AEFB28}" type="datetimeFigureOut">
               <a:rPr lang="en-US" smtClean="0"/>
-              <a:t>25-Nov-16</a:t>
+              <a:t>11/26/2016</a:t>
             </a:fld>
             <a:endParaRPr lang="en-US"/>
           </a:p>
@@ -2344,7 +2344,7 @@
           <a:p>
             <a:fld id="{A1E43CF0-0252-41F7-9C8E-CC9681AEFB28}" type="datetimeFigureOut">
               <a:rPr lang="en-US" smtClean="0"/>
-              <a:t>25-Nov-16</a:t>
+              <a:t>11/26/2016</a:t>
             </a:fld>
             <a:endParaRPr lang="en-US"/>
           </a:p>
@@ -2409,9 +2409,35 @@
 <p:sldMaster xmlns:a="http://schemas.openxmlformats.org/drawingml/2006/main" xmlns:r="http://schemas.openxmlformats.org/officeDocument/2006/relationships" xmlns:p="http://schemas.openxmlformats.org/presentationml/2006/main">
   <p:cSld>
     <p:bg>
-      <p:bgRef idx="1001">
-        <a:schemeClr val="bg1"/>
-      </p:bgRef>
+      <p:bgPr>
+        <a:gradFill flip="none" rotWithShape="1">
+          <a:gsLst>
+            <a:gs pos="0">
+              <a:schemeClr val="accent1">
+                <a:lumMod val="0"/>
+                <a:lumOff val="100000"/>
+              </a:schemeClr>
+            </a:gs>
+            <a:gs pos="71000">
+              <a:schemeClr val="accent1">
+                <a:lumMod val="10000"/>
+                <a:lumOff val="90000"/>
+              </a:schemeClr>
+            </a:gs>
+            <a:gs pos="100000">
+              <a:schemeClr val="accent1">
+                <a:lumMod val="40000"/>
+                <a:lumOff val="60000"/>
+              </a:schemeClr>
+            </a:gs>
+          </a:gsLst>
+          <a:path path="shape">
+            <a:fillToRect l="50000" t="50000" r="50000" b="50000"/>
+          </a:path>
+          <a:tileRect/>
+        </a:gradFill>
+        <a:effectLst/>
+      </p:bgPr>
     </p:bg>
     <p:spTree>
       <p:nvGrpSpPr>
@@ -2555,7 +2581,7 @@
           <a:p>
             <a:fld id="{A1E43CF0-0252-41F7-9C8E-CC9681AEFB28}" type="datetimeFigureOut">
               <a:rPr lang="en-US" smtClean="0"/>
-              <a:t>25-Nov-16</a:t>
+              <a:t>11/26/2016</a:t>
             </a:fld>
             <a:endParaRPr lang="en-US"/>
           </a:p>
@@ -2970,32 +2996,10 @@
             <p:ph type="ctrTitle"/>
           </p:nvPr>
         </p:nvSpPr>
-        <p:spPr/>
-        <p:txBody>
-          <a:bodyPr/>
-          <a:lstStyle/>
-          <a:p>
-            <a:r>
-              <a:rPr lang="en-US" dirty="0"/>
-              <a:t>Predicting Influencers in a Social Network</a:t>
-            </a:r>
-          </a:p>
-        </p:txBody>
-      </p:sp>
-      <p:sp>
-        <p:nvSpPr>
-          <p:cNvPr id="3" name="Subtitle 2"/>
-          <p:cNvSpPr>
-            <a:spLocks noGrp="1"/>
-          </p:cNvSpPr>
-          <p:nvPr>
-            <p:ph type="subTitle" idx="1"/>
-          </p:nvPr>
-        </p:nvSpPr>
         <p:spPr>
           <a:xfrm>
-            <a:off x="1338469" y="4595951"/>
-            <a:ext cx="9144000" cy="1655762"/>
+            <a:off x="0" y="1122363"/>
+            <a:ext cx="12192000" cy="2387600"/>
           </a:xfrm>
         </p:spPr>
         <p:txBody>
@@ -3003,8 +3007,80 @@
           <a:lstStyle/>
           <a:p>
             <a:r>
-              <a:rPr lang="en-US" dirty="0"/>
+              <a:rPr lang="en-US" b="1" dirty="0"/>
+              <a:t>Predicting Influencers in a </a:t>
+            </a:r>
+            <a:br>
+              <a:rPr lang="en-US" b="1" dirty="0"/>
+            </a:br>
+            <a:r>
+              <a:rPr lang="en-US" b="1" dirty="0"/>
+              <a:t>Social Network</a:t>
+            </a:r>
+          </a:p>
+        </p:txBody>
+      </p:sp>
+      <p:sp>
+        <p:nvSpPr>
+          <p:cNvPr id="3" name="Subtitle 2"/>
+          <p:cNvSpPr>
+            <a:spLocks noGrp="1"/>
+          </p:cNvSpPr>
+          <p:nvPr>
+            <p:ph type="subTitle" idx="1"/>
+          </p:nvPr>
+        </p:nvSpPr>
+        <p:spPr>
+          <a:xfrm>
+            <a:off x="0" y="4595951"/>
+            <a:ext cx="12191999" cy="1655762"/>
+          </a:xfrm>
+        </p:spPr>
+        <p:txBody>
+          <a:bodyPr>
+            <a:normAutofit/>
+          </a:bodyPr>
+          <a:lstStyle/>
+          <a:p>
+            <a:r>
+              <a:rPr lang="en-US" b="1" dirty="0"/>
               <a:t>Group 11</a:t>
+            </a:r>
+          </a:p>
+          <a:p>
+            <a:r>
+              <a:rPr lang="en-US" sz="1600" dirty="0" err="1"/>
+              <a:t>Ashkay</a:t>
+            </a:r>
+            <a:r>
+              <a:rPr lang="en-US" sz="1600" dirty="0"/>
+              <a:t> </a:t>
+            </a:r>
+            <a:r>
+              <a:rPr lang="en-US" sz="1600" dirty="0" err="1"/>
+              <a:t>Mehra</a:t>
+            </a:r>
+            <a:endParaRPr lang="en-US" sz="1600" dirty="0"/>
+          </a:p>
+          <a:p>
+            <a:r>
+              <a:rPr lang="en-US" sz="1600" dirty="0" err="1"/>
+              <a:t>Sayam</a:t>
+            </a:r>
+            <a:r>
+              <a:rPr lang="en-US" sz="1600" dirty="0"/>
+              <a:t> </a:t>
+            </a:r>
+            <a:r>
+              <a:rPr lang="en-US" sz="1600" dirty="0" err="1"/>
+              <a:t>Ganguly</a:t>
+            </a:r>
+            <a:endParaRPr lang="en-US" sz="1600" dirty="0"/>
+          </a:p>
+          <a:p>
+            <a:r>
+              <a:rPr lang="en-US" sz="1600" dirty="0"/>
+              <a:t>Patrick Green</a:t>
             </a:r>
           </a:p>
         </p:txBody>
@@ -3323,50 +3399,167 @@
       </p:grpSpPr>
       <p:sp>
         <p:nvSpPr>
-          <p:cNvPr id="2" name="Title 1"/>
-          <p:cNvSpPr>
-            <a:spLocks noGrp="1"/>
-          </p:cNvSpPr>
-          <p:nvPr>
-            <p:ph type="title"/>
-          </p:nvPr>
+          <p:cNvPr id="3" name="TextBox 2"/>
+          <p:cNvSpPr txBox="1"/>
+          <p:nvPr/>
         </p:nvSpPr>
         <p:spPr>
           <a:xfrm>
-            <a:off x="838200" y="365125"/>
-            <a:ext cx="10515600" cy="2987675"/>
+            <a:off x="577792" y="646331"/>
+            <a:ext cx="11036416" cy="5047536"/>
           </a:xfrm>
+          <a:prstGeom prst="rect">
+            <a:avLst/>
+          </a:prstGeom>
+          <a:noFill/>
         </p:spPr>
         <p:txBody>
-          <a:bodyPr>
-            <a:normAutofit/>
+          <a:bodyPr wrap="square" rtlCol="0">
+            <a:spAutoFit/>
           </a:bodyPr>
           <a:lstStyle/>
           <a:p>
             <a:r>
+              <a:rPr lang="en-US" sz="2800" b="1" dirty="0"/>
+              <a:t>Problem Definition</a:t>
+            </a:r>
+          </a:p>
+          <a:p>
+            <a:r>
+              <a:rPr lang="en-US" sz="2000" dirty="0"/>
+              <a:t>Predict the human judgement about which of two users is more influential in a social network, given twitter activity data for the pair. </a:t>
+            </a:r>
+          </a:p>
+          <a:p>
+            <a:endParaRPr lang="en-US" sz="2400" dirty="0"/>
+          </a:p>
+          <a:p>
+            <a:r>
+              <a:rPr lang="en-US" sz="2800" b="1" dirty="0"/>
+              <a:t>Data Set</a:t>
+            </a:r>
+          </a:p>
+          <a:p>
+            <a:r>
+              <a:rPr lang="en-US" sz="2000" dirty="0"/>
+              <a:t>Numeric features for pairs of users (A and B). Both training and test data sets provided.</a:t>
+            </a:r>
+          </a:p>
+          <a:p>
+            <a:pPr marL="285750" indent="-285750">
+              <a:buFont typeface="Arial" panose="020B0604020202020204" pitchFamily="34" charset="0"/>
+              <a:buChar char="•"/>
+            </a:pPr>
+            <a:r>
               <a:rPr lang="en-US" dirty="0"/>
-              <a:t>1.Problem Definition</a:t>
-            </a:r>
-            <a:br>
+              <a:t>Follower/Following Count</a:t>
+            </a:r>
+          </a:p>
+          <a:p>
+            <a:pPr marL="285750" indent="-285750">
+              <a:buFont typeface="Arial" panose="020B0604020202020204" pitchFamily="34" charset="0"/>
+              <a:buChar char="•"/>
+            </a:pPr>
+            <a:r>
               <a:rPr lang="en-US" dirty="0"/>
-            </a:br>
+              <a:t>Mentions Sent/Received</a:t>
+            </a:r>
+          </a:p>
+          <a:p>
+            <a:pPr marL="285750" indent="-285750">
+              <a:buFont typeface="Arial" panose="020B0604020202020204" pitchFamily="34" charset="0"/>
+              <a:buChar char="•"/>
+            </a:pPr>
             <a:r>
               <a:rPr lang="en-US" dirty="0"/>
-              <a:t>2.Evaluation Criteria</a:t>
-            </a:r>
-            <a:br>
+              <a:t>Retweets Sent/Received</a:t>
+            </a:r>
+          </a:p>
+          <a:p>
+            <a:pPr marL="285750" indent="-285750">
+              <a:buFont typeface="Arial" panose="020B0604020202020204" pitchFamily="34" charset="0"/>
+              <a:buChar char="•"/>
+            </a:pPr>
+            <a:r>
               <a:rPr lang="en-US" dirty="0"/>
-            </a:br>
+              <a:t>Post Count</a:t>
+            </a:r>
+          </a:p>
+          <a:p>
+            <a:pPr marL="285750" indent="-285750">
+              <a:buFont typeface="Arial" panose="020B0604020202020204" pitchFamily="34" charset="0"/>
+              <a:buChar char="•"/>
+            </a:pPr>
             <a:r>
               <a:rPr lang="en-US" dirty="0"/>
-              <a:t>3.Description of the dataset</a:t>
-            </a:r>
-            <a:br>
+              <a:t>Listed Count (count of inclusion in user-created categories or lists)</a:t>
+            </a:r>
+          </a:p>
+          <a:p>
+            <a:pPr marL="285750" indent="-285750">
+              <a:buFont typeface="Arial" panose="020B0604020202020204" pitchFamily="34" charset="0"/>
+              <a:buChar char="•"/>
+            </a:pPr>
+            <a:r>
               <a:rPr lang="en-US" dirty="0"/>
-            </a:br>
-            <a:r>
-              <a:rPr lang="en-US" dirty="0"/>
-              <a:t>4. Baseline Solution</a:t>
+              <a:t>Network Features (proprietary calculated features)</a:t>
+            </a:r>
+          </a:p>
+          <a:p>
+            <a:pPr marL="285750" indent="-285750">
+              <a:buFont typeface="Arial" panose="020B0604020202020204" pitchFamily="34" charset="0"/>
+              <a:buChar char="•"/>
+            </a:pPr>
+            <a:endParaRPr lang="en-US" sz="2000" dirty="0"/>
+          </a:p>
+          <a:p>
+            <a:endParaRPr lang="en-US" sz="2000" dirty="0"/>
+          </a:p>
+          <a:p>
+            <a:r>
+              <a:rPr lang="en-US" sz="2000" dirty="0">
+                <a:solidFill>
+                  <a:srgbClr val="FF0000"/>
+                </a:solidFill>
+              </a:rPr>
+              <a:t>TODO – Baseline Solution (do we need this?)</a:t>
+            </a:r>
+          </a:p>
+          <a:p>
+            <a:pPr marL="285750" indent="-285750">
+              <a:buFont typeface="Arial" panose="020B0604020202020204" pitchFamily="34" charset="0"/>
+              <a:buChar char="•"/>
+            </a:pPr>
+            <a:endParaRPr lang="en-US" sz="1400" dirty="0"/>
+          </a:p>
+        </p:txBody>
+      </p:sp>
+      <p:sp>
+        <p:nvSpPr>
+          <p:cNvPr id="4" name="TextBox 3"/>
+          <p:cNvSpPr txBox="1"/>
+          <p:nvPr/>
+        </p:nvSpPr>
+        <p:spPr>
+          <a:xfrm>
+            <a:off x="0" y="0"/>
+            <a:ext cx="12192000" cy="646331"/>
+          </a:xfrm>
+          <a:prstGeom prst="rect">
+            <a:avLst/>
+          </a:prstGeom>
+          <a:noFill/>
+        </p:spPr>
+        <p:txBody>
+          <a:bodyPr wrap="square" rtlCol="0">
+            <a:spAutoFit/>
+          </a:bodyPr>
+          <a:lstStyle/>
+          <a:p>
+            <a:pPr algn="ctr"/>
+            <a:r>
+              <a:rPr lang="en-US" sz="3600" b="1" dirty="0"/>
+              <a:t>Problem Overview</a:t>
             </a:r>
           </a:p>
         </p:txBody>
@@ -3403,100 +3596,178 @@
       </p:grpSpPr>
       <p:sp>
         <p:nvSpPr>
-          <p:cNvPr id="2" name="Title 1"/>
-          <p:cNvSpPr>
-            <a:spLocks noGrp="1"/>
-          </p:cNvSpPr>
-          <p:nvPr>
-            <p:ph type="title"/>
-          </p:nvPr>
-        </p:nvSpPr>
-        <p:spPr/>
-        <p:txBody>
-          <a:bodyPr/>
-          <a:lstStyle/>
-          <a:p>
-            <a:r>
-              <a:rPr lang="en-US" dirty="0"/>
-              <a:t>Overview Of the Methods</a:t>
-            </a:r>
-          </a:p>
-        </p:txBody>
-      </p:sp>
-      <p:sp>
-        <p:nvSpPr>
-          <p:cNvPr id="3" name="Content Placeholder 2"/>
-          <p:cNvSpPr>
-            <a:spLocks noGrp="1"/>
-          </p:cNvSpPr>
-          <p:nvPr>
-            <p:ph idx="1"/>
-          </p:nvPr>
-        </p:nvSpPr>
-        <p:spPr/>
-        <p:txBody>
-          <a:bodyPr/>
-          <a:lstStyle/>
-          <a:p>
-            <a:r>
-              <a:rPr lang="en-US" dirty="0"/>
-              <a:t>Preprocessing</a:t>
-            </a:r>
-          </a:p>
-          <a:p>
-            <a:pPr lvl="1"/>
-            <a:r>
-              <a:rPr lang="en-US" dirty="0"/>
-              <a:t>Feature Selection</a:t>
-            </a:r>
-          </a:p>
-          <a:p>
-            <a:pPr lvl="1"/>
-            <a:r>
-              <a:rPr lang="en-US" dirty="0"/>
-              <a:t>Feature Transformations</a:t>
-            </a:r>
-          </a:p>
-          <a:p>
-            <a:endParaRPr lang="en-US" dirty="0"/>
-          </a:p>
-          <a:p>
-            <a:r>
-              <a:rPr lang="en-US" dirty="0"/>
-              <a:t>Models</a:t>
-            </a:r>
-          </a:p>
-          <a:p>
-            <a:pPr lvl="1"/>
-            <a:r>
-              <a:rPr lang="en-US" dirty="0"/>
+          <p:cNvPr id="6" name="TextBox 5"/>
+          <p:cNvSpPr txBox="1"/>
+          <p:nvPr/>
+        </p:nvSpPr>
+        <p:spPr>
+          <a:xfrm>
+            <a:off x="696033" y="646331"/>
+            <a:ext cx="9177556" cy="5570756"/>
+          </a:xfrm>
+          <a:prstGeom prst="rect">
+            <a:avLst/>
+          </a:prstGeom>
+          <a:noFill/>
+        </p:spPr>
+        <p:txBody>
+          <a:bodyPr wrap="square" rtlCol="0">
+            <a:spAutoFit/>
+          </a:bodyPr>
+          <a:lstStyle/>
+          <a:p>
+            <a:r>
+              <a:rPr lang="en-US" sz="2800" b="1" dirty="0"/>
+              <a:t>Pre-processing</a:t>
+            </a:r>
+          </a:p>
+          <a:p>
+            <a:pPr marL="342900" indent="-342900">
+              <a:buFont typeface="Arial" panose="020B0604020202020204" pitchFamily="34" charset="0"/>
+              <a:buChar char="•"/>
+            </a:pPr>
+            <a:r>
+              <a:rPr lang="en-US" sz="2000" dirty="0"/>
+              <a:t>Feature Selection – determine which features correlate with influence</a:t>
+            </a:r>
+          </a:p>
+          <a:p>
+            <a:pPr marL="342900" indent="-342900">
+              <a:buFont typeface="Arial" panose="020B0604020202020204" pitchFamily="34" charset="0"/>
+              <a:buChar char="•"/>
+            </a:pPr>
+            <a:r>
+              <a:rPr lang="en-US" sz="2000" dirty="0"/>
+              <a:t>Feature Transformations – normalize data </a:t>
+            </a:r>
+          </a:p>
+          <a:p>
+            <a:endParaRPr lang="en-US" sz="2800" b="1" dirty="0"/>
+          </a:p>
+          <a:p>
+            <a:r>
+              <a:rPr lang="en-US" sz="2800" b="1" dirty="0"/>
+              <a:t>Modeling</a:t>
+            </a:r>
+            <a:r>
+              <a:rPr lang="en-US" sz="2800" dirty="0"/>
+              <a:t> </a:t>
+            </a:r>
+            <a:r>
+              <a:rPr lang="en-US" sz="2800" b="1" dirty="0"/>
+              <a:t>Methods</a:t>
+            </a:r>
+          </a:p>
+          <a:p>
+            <a:pPr marL="342900" indent="-342900">
+              <a:buFont typeface="Arial" panose="020B0604020202020204" pitchFamily="34" charset="0"/>
+              <a:buChar char="•"/>
+            </a:pPr>
+            <a:r>
+              <a:rPr lang="en-US" sz="2000" dirty="0"/>
               <a:t>Logistic Regression</a:t>
             </a:r>
           </a:p>
           <a:p>
-            <a:pPr lvl="1"/>
-            <a:r>
-              <a:rPr lang="en-US" dirty="0"/>
-              <a:t>NN</a:t>
-            </a:r>
-          </a:p>
-          <a:p>
-            <a:pPr lvl="1"/>
-            <a:r>
-              <a:rPr lang="en-US" dirty="0"/>
-              <a:t>SVM</a:t>
-            </a:r>
-          </a:p>
-          <a:p>
-            <a:pPr lvl="1"/>
-            <a:r>
-              <a:rPr lang="en-US" dirty="0"/>
+            <a:pPr marL="342900" indent="-342900">
+              <a:buFont typeface="Arial" panose="020B0604020202020204" pitchFamily="34" charset="0"/>
+              <a:buChar char="•"/>
+            </a:pPr>
+            <a:r>
+              <a:rPr lang="en-US" sz="2000" dirty="0"/>
+              <a:t>Neural Network</a:t>
+            </a:r>
+          </a:p>
+          <a:p>
+            <a:pPr marL="342900" indent="-342900">
+              <a:buFont typeface="Arial" panose="020B0604020202020204" pitchFamily="34" charset="0"/>
+              <a:buChar char="•"/>
+            </a:pPr>
+            <a:r>
+              <a:rPr lang="en-US" sz="2000" dirty="0"/>
+              <a:t>Support Vector Machines (SVM)</a:t>
+            </a:r>
+          </a:p>
+          <a:p>
+            <a:pPr marL="342900" indent="-342900">
+              <a:buFont typeface="Arial" panose="020B0604020202020204" pitchFamily="34" charset="0"/>
+              <a:buChar char="•"/>
+            </a:pPr>
+            <a:r>
+              <a:rPr lang="en-US" sz="2000" dirty="0"/>
               <a:t>Ensemble</a:t>
             </a:r>
           </a:p>
           <a:p>
-            <a:pPr lvl="1"/>
-            <a:endParaRPr lang="en-US" dirty="0"/>
+            <a:pPr marL="342900" indent="-342900">
+              <a:buFont typeface="Arial" panose="020B0604020202020204" pitchFamily="34" charset="0"/>
+              <a:buChar char="•"/>
+            </a:pPr>
+            <a:endParaRPr lang="en-US" sz="2000" dirty="0"/>
+          </a:p>
+          <a:p>
+            <a:r>
+              <a:rPr lang="en-US" sz="2800" b="1" dirty="0"/>
+              <a:t>Evaluation</a:t>
+            </a:r>
+          </a:p>
+          <a:p>
+            <a:r>
+              <a:rPr lang="en-US" sz="2000" dirty="0"/>
+              <a:t>Measuring the area under the Receiver Operating Characteristic (ROC) curve, which plots true positives against false positives for probabilistic outcomes for a range of thresholds. (</a:t>
+            </a:r>
+            <a:r>
+              <a:rPr lang="en-US" sz="2000" dirty="0">
+                <a:solidFill>
+                  <a:srgbClr val="FF0000"/>
+                </a:solidFill>
+              </a:rPr>
+              <a:t>TODO – Add Sample</a:t>
+            </a:r>
+            <a:r>
+              <a:rPr lang="en-US" sz="2000" dirty="0"/>
+              <a:t>)</a:t>
+            </a:r>
+          </a:p>
+          <a:p>
+            <a:pPr marL="342900" indent="-342900">
+              <a:buFont typeface="Arial" panose="020B0604020202020204" pitchFamily="34" charset="0"/>
+              <a:buChar char="•"/>
+            </a:pPr>
+            <a:endParaRPr lang="en-US" sz="2000" dirty="0"/>
+          </a:p>
+          <a:p>
+            <a:endParaRPr lang="en-US" sz="2400" dirty="0"/>
+          </a:p>
+        </p:txBody>
+      </p:sp>
+      <p:sp>
+        <p:nvSpPr>
+          <p:cNvPr id="4" name="TextBox 3"/>
+          <p:cNvSpPr txBox="1"/>
+          <p:nvPr/>
+        </p:nvSpPr>
+        <p:spPr>
+          <a:xfrm>
+            <a:off x="0" y="0"/>
+            <a:ext cx="12192000" cy="646331"/>
+          </a:xfrm>
+          <a:prstGeom prst="rect">
+            <a:avLst/>
+          </a:prstGeom>
+          <a:noFill/>
+        </p:spPr>
+        <p:txBody>
+          <a:bodyPr wrap="square" rtlCol="0">
+            <a:spAutoFit/>
+          </a:bodyPr>
+          <a:lstStyle/>
+          <a:p>
+            <a:pPr algn="ctr"/>
+            <a:r>
+              <a:rPr lang="en-US" sz="3600" b="1" dirty="0"/>
+              <a:t>Approach</a:t>
+            </a:r>
           </a:p>
         </p:txBody>
       </p:sp>
@@ -3532,28 +3803,6 @@
       </p:grpSpPr>
       <p:sp>
         <p:nvSpPr>
-          <p:cNvPr id="2" name="Title 1"/>
-          <p:cNvSpPr>
-            <a:spLocks noGrp="1"/>
-          </p:cNvSpPr>
-          <p:nvPr>
-            <p:ph type="title"/>
-          </p:nvPr>
-        </p:nvSpPr>
-        <p:spPr/>
-        <p:txBody>
-          <a:bodyPr/>
-          <a:lstStyle/>
-          <a:p>
-            <a:r>
-              <a:rPr lang="en-US" dirty="0"/>
-              <a:t>Preprocessing</a:t>
-            </a:r>
-          </a:p>
-        </p:txBody>
-      </p:sp>
-      <p:sp>
-        <p:nvSpPr>
           <p:cNvPr id="3" name="Content Placeholder 2"/>
           <p:cNvSpPr>
             <a:spLocks noGrp="1"/>
@@ -3562,7 +3811,12 @@
             <p:ph idx="1"/>
           </p:nvPr>
         </p:nvSpPr>
-        <p:spPr/>
+        <p:spPr>
+          <a:xfrm>
+            <a:off x="561108" y="717261"/>
+            <a:ext cx="11404615" cy="4351338"/>
+          </a:xfrm>
+        </p:spPr>
         <p:txBody>
           <a:bodyPr/>
           <a:lstStyle/>
@@ -3622,6 +3876,126 @@
           </a:p>
         </p:txBody>
       </p:sp>
+      <p:sp>
+        <p:nvSpPr>
+          <p:cNvPr id="4" name="TextBox 3"/>
+          <p:cNvSpPr txBox="1"/>
+          <p:nvPr/>
+        </p:nvSpPr>
+        <p:spPr>
+          <a:xfrm>
+            <a:off x="0" y="0"/>
+            <a:ext cx="12192000" cy="646331"/>
+          </a:xfrm>
+          <a:prstGeom prst="rect">
+            <a:avLst/>
+          </a:prstGeom>
+          <a:noFill/>
+        </p:spPr>
+        <p:txBody>
+          <a:bodyPr wrap="square" rtlCol="0">
+            <a:spAutoFit/>
+          </a:bodyPr>
+          <a:lstStyle/>
+          <a:p>
+            <a:pPr algn="ctr"/>
+            <a:r>
+              <a:rPr lang="en-US" sz="3600" b="1" dirty="0"/>
+              <a:t>Feature Selection</a:t>
+            </a:r>
+          </a:p>
+        </p:txBody>
+      </p:sp>
+      <p:pic>
+        <p:nvPicPr>
+          <p:cNvPr id="6" name="Picture 5"/>
+          <p:cNvPicPr>
+            <a:picLocks noChangeAspect="1"/>
+          </p:cNvPicPr>
+          <p:nvPr/>
+        </p:nvPicPr>
+        <p:blipFill>
+          <a:blip r:embed="rId2">
+            <a:extLst>
+              <a:ext uri="{28A0092B-C50C-407E-A947-70E740481C1C}">
+                <a14:useLocalDpi xmlns:a14="http://schemas.microsoft.com/office/drawing/2010/main" val="0"/>
+              </a:ext>
+            </a:extLst>
+          </a:blip>
+          <a:stretch>
+            <a:fillRect/>
+          </a:stretch>
+        </p:blipFill>
+        <p:spPr>
+          <a:xfrm>
+            <a:off x="7921964" y="1099128"/>
+            <a:ext cx="3083179" cy="2261563"/>
+          </a:xfrm>
+          <a:prstGeom prst="rect">
+            <a:avLst/>
+          </a:prstGeom>
+        </p:spPr>
+      </p:pic>
+      <p:pic>
+        <p:nvPicPr>
+          <p:cNvPr id="7" name="Picture 6"/>
+          <p:cNvPicPr>
+            <a:picLocks noChangeAspect="1"/>
+          </p:cNvPicPr>
+          <p:nvPr/>
+        </p:nvPicPr>
+        <p:blipFill>
+          <a:blip r:embed="rId3">
+            <a:extLst>
+              <a:ext uri="{28A0092B-C50C-407E-A947-70E740481C1C}">
+                <a14:useLocalDpi xmlns:a14="http://schemas.microsoft.com/office/drawing/2010/main" val="0"/>
+              </a:ext>
+            </a:extLst>
+          </a:blip>
+          <a:stretch>
+            <a:fillRect/>
+          </a:stretch>
+        </p:blipFill>
+        <p:spPr>
+          <a:xfrm>
+            <a:off x="8845885" y="3624600"/>
+            <a:ext cx="3119839" cy="2288454"/>
+          </a:xfrm>
+          <a:prstGeom prst="rect">
+            <a:avLst/>
+          </a:prstGeom>
+        </p:spPr>
+      </p:pic>
+      <p:pic>
+        <p:nvPicPr>
+          <p:cNvPr id="8" name="Picture 7"/>
+          <p:cNvPicPr>
+            <a:picLocks noChangeAspect="1"/>
+          </p:cNvPicPr>
+          <p:nvPr/>
+        </p:nvPicPr>
+        <p:blipFill>
+          <a:blip r:embed="rId4">
+            <a:extLst>
+              <a:ext uri="{28A0092B-C50C-407E-A947-70E740481C1C}">
+                <a14:useLocalDpi xmlns:a14="http://schemas.microsoft.com/office/drawing/2010/main" val="0"/>
+              </a:ext>
+            </a:extLst>
+          </a:blip>
+          <a:stretch>
+            <a:fillRect/>
+          </a:stretch>
+        </p:blipFill>
+        <p:spPr>
+          <a:xfrm>
+            <a:off x="5022682" y="4262679"/>
+            <a:ext cx="3120955" cy="2289272"/>
+          </a:xfrm>
+          <a:prstGeom prst="rect">
+            <a:avLst/>
+          </a:prstGeom>
+        </p:spPr>
+      </p:pic>
     </p:spTree>
     <p:extLst>
       <p:ext uri="{BB962C8B-B14F-4D97-AF65-F5344CB8AC3E}">
@@ -3654,28 +4028,6 @@
       </p:grpSpPr>
       <p:sp>
         <p:nvSpPr>
-          <p:cNvPr id="2" name="Title 1"/>
-          <p:cNvSpPr>
-            <a:spLocks noGrp="1"/>
-          </p:cNvSpPr>
-          <p:nvPr>
-            <p:ph type="title"/>
-          </p:nvPr>
-        </p:nvSpPr>
-        <p:spPr/>
-        <p:txBody>
-          <a:bodyPr/>
-          <a:lstStyle/>
-          <a:p>
-            <a:r>
-              <a:rPr lang="en-US" dirty="0"/>
-              <a:t>Preprocessing</a:t>
-            </a:r>
-          </a:p>
-        </p:txBody>
-      </p:sp>
-      <p:sp>
-        <p:nvSpPr>
           <p:cNvPr id="3" name="Content Placeholder 2"/>
           <p:cNvSpPr>
             <a:spLocks noGrp="1"/>
@@ -3684,42 +4036,156 @@
             <p:ph idx="1"/>
           </p:nvPr>
         </p:nvSpPr>
-        <p:spPr/>
-        <p:txBody>
-          <a:bodyPr/>
-          <a:lstStyle/>
-          <a:p>
-            <a:r>
-              <a:rPr lang="en-US" dirty="0"/>
-              <a:t>Feature Transformation (add graphs for Logistic Regression)(Patrick)</a:t>
+        <p:spPr>
+          <a:xfrm>
+            <a:off x="729144" y="785390"/>
+            <a:ext cx="10515600" cy="4351338"/>
+          </a:xfrm>
+        </p:spPr>
+        <p:txBody>
+          <a:bodyPr>
+            <a:normAutofit/>
+          </a:bodyPr>
+          <a:lstStyle/>
+          <a:p>
+            <a:r>
+              <a:rPr lang="en-US" sz="2000" b="1" dirty="0"/>
+              <a:t>Delta Transform</a:t>
             </a:r>
           </a:p>
           <a:p>
             <a:pPr lvl="1"/>
             <a:r>
-              <a:rPr lang="en-US" dirty="0"/>
-              <a:t>Delta</a:t>
+              <a:rPr lang="en-US" sz="1600" dirty="0"/>
+              <a:t>Absolute difference between values for two users</a:t>
             </a:r>
           </a:p>
           <a:p>
             <a:pPr lvl="1"/>
             <a:r>
-              <a:rPr lang="en-US" dirty="0"/>
-              <a:t>Discrete </a:t>
+              <a:rPr lang="en-US" sz="1600" dirty="0"/>
+              <a:t>Baseline</a:t>
             </a:r>
           </a:p>
           <a:p>
             <a:pPr lvl="1"/>
             <a:r>
-              <a:rPr lang="en-US" dirty="0"/>
-              <a:t>Normalization</a:t>
+              <a:rPr lang="en-US" sz="1600" dirty="0"/>
+              <a:t>Preserves the meaning of large difference in values</a:t>
+            </a:r>
+          </a:p>
+          <a:p>
+            <a:r>
+              <a:rPr lang="en-US" sz="2000" b="1" dirty="0"/>
+              <a:t>Binary Transform</a:t>
             </a:r>
           </a:p>
           <a:p>
             <a:pPr lvl="1"/>
             <a:r>
-              <a:rPr lang="en-US" dirty="0"/>
-              <a:t>Log</a:t>
+              <a:rPr lang="en-US" sz="1600" dirty="0"/>
+              <a:t>Reduce difference to one (larger for user A) or zero (larger for user B)</a:t>
+            </a:r>
+          </a:p>
+          <a:p>
+            <a:pPr lvl="1"/>
+            <a:r>
+              <a:rPr lang="en-US" sz="1600" dirty="0"/>
+              <a:t>Simpler data set, but discards the magnitude of differences</a:t>
+            </a:r>
+          </a:p>
+          <a:p>
+            <a:r>
+              <a:rPr lang="en-US" sz="2000" b="1" dirty="0"/>
+              <a:t>Logarithm</a:t>
+            </a:r>
+          </a:p>
+          <a:p>
+            <a:pPr lvl="1"/>
+            <a:r>
+              <a:rPr lang="en-US" sz="1600" dirty="0"/>
+              <a:t>Reduces large differences in the orders of magnitude in features (</a:t>
+            </a:r>
+            <a:r>
+              <a:rPr lang="en-US" sz="1600" dirty="0" err="1"/>
+              <a:t>ie</a:t>
+            </a:r>
+            <a:r>
+              <a:rPr lang="en-US" sz="1600" dirty="0"/>
+              <a:t>. follower versus following counts)</a:t>
+            </a:r>
+          </a:p>
+          <a:p>
+            <a:pPr lvl="1"/>
+            <a:r>
+              <a:rPr lang="en-US" sz="1600" dirty="0"/>
+              <a:t>Simplifies non-linear relationships between input and output.</a:t>
+            </a:r>
+          </a:p>
+          <a:p>
+            <a:pPr lvl="1"/>
+            <a:endParaRPr lang="en-US" sz="1600" dirty="0"/>
+          </a:p>
+          <a:p>
+            <a:pPr marL="0" indent="0">
+              <a:buNone/>
+            </a:pPr>
+            <a:r>
+              <a:rPr lang="en-US" sz="2000" dirty="0">
+                <a:solidFill>
+                  <a:srgbClr val="FF0000"/>
+                </a:solidFill>
+              </a:rPr>
+              <a:t>TODO – Add comparison graph for logistic regression</a:t>
+            </a:r>
+          </a:p>
+          <a:p>
+            <a:pPr marL="0" indent="0">
+              <a:buNone/>
+            </a:pPr>
+            <a:r>
+              <a:rPr lang="en-US" sz="2000" dirty="0">
+                <a:solidFill>
+                  <a:srgbClr val="FF0000"/>
+                </a:solidFill>
+              </a:rPr>
+              <a:t>TODO - Normalization</a:t>
+            </a:r>
+          </a:p>
+          <a:p>
+            <a:pPr marL="0" indent="0">
+              <a:buNone/>
+            </a:pPr>
+            <a:endParaRPr lang="en-US" sz="2000" b="1" dirty="0"/>
+          </a:p>
+        </p:txBody>
+      </p:sp>
+      <p:sp>
+        <p:nvSpPr>
+          <p:cNvPr id="4" name="TextBox 3"/>
+          <p:cNvSpPr txBox="1"/>
+          <p:nvPr/>
+        </p:nvSpPr>
+        <p:spPr>
+          <a:xfrm>
+            <a:off x="0" y="0"/>
+            <a:ext cx="12192000" cy="646331"/>
+          </a:xfrm>
+          <a:prstGeom prst="rect">
+            <a:avLst/>
+          </a:prstGeom>
+          <a:noFill/>
+        </p:spPr>
+        <p:txBody>
+          <a:bodyPr wrap="square" rtlCol="0">
+            <a:spAutoFit/>
+          </a:bodyPr>
+          <a:lstStyle/>
+          <a:p>
+            <a:pPr algn="ctr"/>
+            <a:r>
+              <a:rPr lang="en-US" sz="3600" b="1" dirty="0"/>
+              <a:t>Feature Transformation</a:t>
             </a:r>
           </a:p>
         </p:txBody>

</xml_diff>